<commit_message>
Update Creating Custom Connectors for the Power Platform.pptx
</commit_message>
<xml_diff>
--- a/D365UG-CRMUG Summit EMEA - March 2019/Creating Custom Connectors for the Power Platform/Creating Custom Connectors for the Power Platform.pptx
+++ b/D365UG-CRMUG Summit EMEA - March 2019/Creating Custom Connectors for the Power Platform/Creating Custom Connectors for the Power Platform.pptx
@@ -5,10 +5,10 @@
     <p:sldMasterId id="2147484229" r:id="rId4"/>
   </p:sldMasterIdLst>
   <p:notesMasterIdLst>
-    <p:notesMasterId r:id="rId23"/>
+    <p:notesMasterId r:id="rId22"/>
   </p:notesMasterIdLst>
   <p:handoutMasterIdLst>
-    <p:handoutMasterId r:id="rId24"/>
+    <p:handoutMasterId r:id="rId23"/>
   </p:handoutMasterIdLst>
   <p:sldIdLst>
     <p:sldId id="1384" r:id="rId5"/>
@@ -24,11 +24,10 @@
     <p:sldId id="1411" r:id="rId15"/>
     <p:sldId id="1412" r:id="rId16"/>
     <p:sldId id="1413" r:id="rId17"/>
-    <p:sldId id="1414" r:id="rId18"/>
-    <p:sldId id="1415" r:id="rId19"/>
-    <p:sldId id="1416" r:id="rId20"/>
-    <p:sldId id="1417" r:id="rId21"/>
-    <p:sldId id="1373" r:id="rId22"/>
+    <p:sldId id="1415" r:id="rId18"/>
+    <p:sldId id="1416" r:id="rId19"/>
+    <p:sldId id="1417" r:id="rId20"/>
+    <p:sldId id="1373" r:id="rId21"/>
   </p:sldIdLst>
   <p:sldSz cx="12436475" cy="6994525"/>
   <p:notesSz cx="6858000" cy="9144000"/>
@@ -145,7 +144,6 @@
             <p14:sldId id="1411"/>
             <p14:sldId id="1412"/>
             <p14:sldId id="1413"/>
-            <p14:sldId id="1414"/>
             <p14:sldId id="1415"/>
             <p14:sldId id="1416"/>
             <p14:sldId id="1417"/>
@@ -334,7 +332,7 @@
                 <a:latin typeface="Arial" panose="020B0604020202020204" pitchFamily="34" charset="0"/>
                 <a:cs typeface="Arial" panose="020B0604020202020204" pitchFamily="34" charset="0"/>
               </a:rPr>
-              <a:t>3/10/2019 7:00 PM</a:t>
+              <a:t>3/25/2019 8:56 AM</a:t>
             </a:fld>
             <a:endParaRPr lang="en-US" dirty="0">
               <a:latin typeface="Arial" panose="020B0604020202020204" pitchFamily="34" charset="0"/>
@@ -570,7 +568,7 @@
           <a:p>
             <a:fld id="{2058EF5B-311B-4148-8831-2D28534D49CD}" type="datetime8">
               <a:rPr lang="en-US" smtClean="0"/>
-              <a:t>3/10/2019 7:00 PM</a:t>
+              <a:t>3/25/2019 8:56 AM</a:t>
             </a:fld>
             <a:endParaRPr lang="en-US" dirty="0"/>
           </a:p>
@@ -950,7 +948,7 @@
           <a:p>
             <a:fld id="{67C6B1E4-98EC-4312-8FF0-D36B8081355F}" type="datetime8">
               <a:rPr lang="en-US" smtClean="0"/>
-              <a:t>3/10/2019 7:00 PM</a:t>
+              <a:t>3/25/2019 8:56 AM</a:t>
             </a:fld>
             <a:endParaRPr lang="en-US" dirty="0"/>
           </a:p>
@@ -1077,7 +1075,7 @@
           <a:p>
             <a:fld id="{02A3604C-CECE-4D09-A711-D0791298311C}" type="datetime8">
               <a:rPr lang="en-US" smtClean="0"/>
-              <a:t>3/10/2019 7:00 PM</a:t>
+              <a:t>3/25/2019 8:56 AM</a:t>
             </a:fld>
             <a:endParaRPr lang="en-US" dirty="0"/>
           </a:p>
@@ -1204,7 +1202,7 @@
           <a:p>
             <a:fld id="{02A3604C-CECE-4D09-A711-D0791298311C}" type="datetime8">
               <a:rPr lang="en-US" smtClean="0"/>
-              <a:t>3/10/2019 7:00 PM</a:t>
+              <a:t>3/25/2019 8:56 AM</a:t>
             </a:fld>
             <a:endParaRPr lang="en-US" dirty="0"/>
           </a:p>
@@ -1354,7 +1352,7 @@
                   <a:prstClr val="black"/>
                 </a:solidFill>
               </a:rPr>
-              <a:t>3/10/2019 7:00 PM</a:t>
+              <a:t>3/25/2019 8:56 AM</a:t>
             </a:fld>
             <a:endParaRPr lang="en-US" dirty="0">
               <a:solidFill>
@@ -1386,7 +1384,7 @@
                 </a:solidFill>
               </a:rPr>
               <a:pPr/>
-              <a:t>18</a:t>
+              <a:t>17</a:t>
             </a:fld>
             <a:endParaRPr lang="en-US" dirty="0">
               <a:solidFill>
@@ -5897,139 +5895,6 @@
           <p:cNvPr id="2" name="Text Placeholder 1">
             <a:extLst>
               <a:ext uri="{FF2B5EF4-FFF2-40B4-BE49-F238E27FC236}">
-                <a16:creationId xmlns:a16="http://schemas.microsoft.com/office/drawing/2014/main" id="{FBFD1400-E5B1-4DEA-A8E3-84DFD21EB60A}"/>
-              </a:ext>
-            </a:extLst>
-          </p:cNvPr>
-          <p:cNvSpPr>
-            <a:spLocks noGrp="1"/>
-          </p:cNvSpPr>
-          <p:nvPr>
-            <p:ph type="body" sz="quarter" idx="10"/>
-          </p:nvPr>
-        </p:nvSpPr>
-        <p:spPr>
-          <a:xfrm>
-            <a:off x="658368" y="1572768"/>
-            <a:ext cx="11424339" cy="2292935"/>
-          </a:xfrm>
-        </p:spPr>
-        <p:txBody>
-          <a:bodyPr/>
-          <a:lstStyle/>
-          <a:p>
-            <a:r>
-              <a:rPr lang="en-US" sz="3000" dirty="0"/>
-              <a:t>Handle Microsoft specific extended Open API definitions</a:t>
-            </a:r>
-            <a:endParaRPr lang="en-US" sz="3000" dirty="0">
-              <a:hlinkClick r:id="rId2">
-                <a:extLst>
-                  <a:ext uri="{A12FA001-AC4F-418D-AE19-62706E023703}">
-                    <ahyp:hlinkClr xmlns:ahyp="http://schemas.microsoft.com/office/drawing/2018/hyperlinkcolor" val="tx"/>
-                  </a:ext>
-                </a:extLst>
-              </a:hlinkClick>
-            </a:endParaRPr>
-          </a:p>
-          <a:p>
-            <a:r>
-              <a:rPr lang="en-US" sz="2000" dirty="0">
-                <a:hlinkClick r:id="rId2"/>
-              </a:rPr>
-              <a:t>https://github.com/BenasJacikas/swashbuckle-flow-extension-core</a:t>
-            </a:r>
-            <a:endParaRPr lang="en-US" sz="2000" dirty="0"/>
-          </a:p>
-          <a:p>
-            <a:r>
-              <a:rPr lang="en-US" sz="2000" dirty="0">
-                <a:hlinkClick r:id="rId3"/>
-              </a:rPr>
-              <a:t>https://github.com/jlattimer/swashbuckle-flow-extension-core</a:t>
-            </a:r>
-            <a:endParaRPr lang="en-US" sz="2000" dirty="0"/>
-          </a:p>
-          <a:p>
-            <a:r>
-              <a:rPr lang="en-US" sz="3000" dirty="0"/>
-              <a:t>Decorate methods &amp; properties</a:t>
-            </a:r>
-          </a:p>
-          <a:p>
-            <a:r>
-              <a:rPr lang="en-US" sz="3000" dirty="0"/>
-              <a:t>Updates the existing Open API definition returned</a:t>
-            </a:r>
-          </a:p>
-        </p:txBody>
-      </p:sp>
-      <p:sp>
-        <p:nvSpPr>
-          <p:cNvPr id="3" name="Title 2">
-            <a:extLst>
-              <a:ext uri="{FF2B5EF4-FFF2-40B4-BE49-F238E27FC236}">
-                <a16:creationId xmlns:a16="http://schemas.microsoft.com/office/drawing/2014/main" id="{2B9A3C76-0838-4EDF-9ED1-BD8D73FAFD82}"/>
-              </a:ext>
-            </a:extLst>
-          </p:cNvPr>
-          <p:cNvSpPr>
-            <a:spLocks noGrp="1"/>
-          </p:cNvSpPr>
-          <p:nvPr>
-            <p:ph type="title"/>
-          </p:nvPr>
-        </p:nvSpPr>
-        <p:spPr/>
-        <p:txBody>
-          <a:bodyPr/>
-          <a:lstStyle/>
-          <a:p>
-            <a:r>
-              <a:rPr lang="en-US" dirty="0"/>
-              <a:t>.NET Web API</a:t>
-            </a:r>
-          </a:p>
-        </p:txBody>
-      </p:sp>
-    </p:spTree>
-    <p:extLst>
-      <p:ext uri="{BB962C8B-B14F-4D97-AF65-F5344CB8AC3E}">
-        <p14:creationId xmlns:p14="http://schemas.microsoft.com/office/powerpoint/2010/main" val="2651771274"/>
-      </p:ext>
-    </p:extLst>
-  </p:cSld>
-  <p:clrMapOvr>
-    <a:masterClrMapping/>
-  </p:clrMapOvr>
-  <p:transition>
-    <p:fade/>
-  </p:transition>
-</p:sld>
-</file>
-
-<file path=ppt/slides/slide15.xml><?xml version="1.0" encoding="utf-8"?>
-<p:sld xmlns:a="http://schemas.openxmlformats.org/drawingml/2006/main" xmlns:r="http://schemas.openxmlformats.org/officeDocument/2006/relationships" xmlns:p="http://schemas.openxmlformats.org/presentationml/2006/main">
-  <p:cSld>
-    <p:spTree>
-      <p:nvGrpSpPr>
-        <p:cNvPr id="1" name=""/>
-        <p:cNvGrpSpPr/>
-        <p:nvPr/>
-      </p:nvGrpSpPr>
-      <p:grpSpPr>
-        <a:xfrm>
-          <a:off x="0" y="0"/>
-          <a:ext cx="0" cy="0"/>
-          <a:chOff x="0" y="0"/>
-          <a:chExt cx="0" cy="0"/>
-        </a:xfrm>
-      </p:grpSpPr>
-      <p:sp>
-        <p:nvSpPr>
-          <p:cNvPr id="2" name="Text Placeholder 1">
-            <a:extLst>
-              <a:ext uri="{FF2B5EF4-FFF2-40B4-BE49-F238E27FC236}">
                 <a16:creationId xmlns:a16="http://schemas.microsoft.com/office/drawing/2014/main" id="{0F4592B4-968E-4353-BCEB-3F32BB0F58D8}"/>
               </a:ext>
             </a:extLst>
@@ -6139,7 +6004,7 @@
 </p:sld>
 </file>
 
-<file path=ppt/slides/slide16.xml><?xml version="1.0" encoding="utf-8"?>
+<file path=ppt/slides/slide15.xml><?xml version="1.0" encoding="utf-8"?>
 <p:sld xmlns:a="http://schemas.openxmlformats.org/drawingml/2006/main" xmlns:r="http://schemas.openxmlformats.org/officeDocument/2006/relationships" xmlns:p="http://schemas.openxmlformats.org/presentationml/2006/main">
   <p:cSld>
     <p:spTree>
@@ -6270,7 +6135,7 @@
 </p:sld>
 </file>
 
-<file path=ppt/slides/slide17.xml><?xml version="1.0" encoding="utf-8"?>
+<file path=ppt/slides/slide16.xml><?xml version="1.0" encoding="utf-8"?>
 <p:sld xmlns:a="http://schemas.openxmlformats.org/drawingml/2006/main" xmlns:r="http://schemas.openxmlformats.org/officeDocument/2006/relationships" xmlns:p="http://schemas.openxmlformats.org/presentationml/2006/main">
   <p:cSld>
     <p:spTree>
@@ -6461,7 +6326,7 @@
 </p:sld>
 </file>
 
-<file path=ppt/slides/slide18.xml><?xml version="1.0" encoding="utf-8"?>
+<file path=ppt/slides/slide17.xml><?xml version="1.0" encoding="utf-8"?>
 <p:sld xmlns:a="http://schemas.openxmlformats.org/drawingml/2006/main" xmlns:r="http://schemas.openxmlformats.org/officeDocument/2006/relationships" xmlns:p="http://schemas.openxmlformats.org/presentationml/2006/main">
   <p:cSld>
     <p:spTree>
@@ -9026,6 +8891,12 @@
 </file>
 
 <file path=customXml/item2.xml><?xml version="1.0" encoding="utf-8"?>
+<p:properties xmlns:p="http://schemas.microsoft.com/office/2006/metadata/properties" xmlns:xsi="http://www.w3.org/2001/XMLSchema-instance" xmlns:pc="http://schemas.microsoft.com/office/infopath/2007/PartnerControls">
+  <documentManagement/>
+</p:properties>
+</file>
+
+<file path=customXml/item3.xml><?xml version="1.0" encoding="utf-8"?>
 <ct:contentTypeSchema xmlns:ct="http://schemas.microsoft.com/office/2006/metadata/contentType" xmlns:ma="http://schemas.microsoft.com/office/2006/metadata/properties/metaAttributes" ct:_="" ma:_="" ma:contentTypeName="Document" ma:contentTypeID="0x01010028C27F6A29DBC5499A29145CCF8A6FEF" ma:contentTypeVersion="13" ma:contentTypeDescription="Create a new document." ma:contentTypeScope="" ma:versionID="33089831409de2006d720ccaa4ba435b">
   <xsd:schema xmlns:xsd="http://www.w3.org/2001/XMLSchema" xmlns:xs="http://www.w3.org/2001/XMLSchema" xmlns:p="http://schemas.microsoft.com/office/2006/metadata/properties" xmlns:ns2="bb5988d6-8fef-43bf-8684-73b55c79ce34" xmlns:ns3="3dd97c74-5ef0-47a1-a0c0-112a138906c0" targetNamespace="http://schemas.microsoft.com/office/2006/metadata/properties" ma:root="true" ma:fieldsID="dd9e917392db8ddc1d122c39535b6523" ns2:_="" ns3:_="">
     <xsd:import namespace="bb5988d6-8fef-43bf-8684-73b55c79ce34"/>
@@ -9248,12 +9119,6 @@
 </ct:contentTypeSchema>
 </file>
 
-<file path=customXml/item3.xml><?xml version="1.0" encoding="utf-8"?>
-<p:properties xmlns:p="http://schemas.microsoft.com/office/2006/metadata/properties" xmlns:xsi="http://www.w3.org/2001/XMLSchema-instance" xmlns:pc="http://schemas.microsoft.com/office/infopath/2007/PartnerControls">
-  <documentManagement/>
-</p:properties>
-</file>
-
 <file path=customXml/itemProps1.xml><?xml version="1.0" encoding="utf-8"?>
 <ds:datastoreItem xmlns:ds="http://schemas.openxmlformats.org/officeDocument/2006/customXml" ds:itemID="{758FDAC0-319D-4A54-8D8E-1D42CB1F8004}">
   <ds:schemaRefs>
@@ -9263,6 +9128,23 @@
 </file>
 
 <file path=customXml/itemProps2.xml><?xml version="1.0" encoding="utf-8"?>
+<ds:datastoreItem xmlns:ds="http://schemas.openxmlformats.org/officeDocument/2006/customXml" ds:itemID="{F990F116-B58F-4255-B05B-DA3808E0E5C6}">
+  <ds:schemaRefs>
+    <ds:schemaRef ds:uri="http://schemas.microsoft.com/office/2006/documentManagement/types"/>
+    <ds:schemaRef ds:uri="http://purl.org/dc/terms/"/>
+    <ds:schemaRef ds:uri="http://schemas.openxmlformats.org/package/2006/metadata/core-properties"/>
+    <ds:schemaRef ds:uri="http://purl.org/dc/dcmitype/"/>
+    <ds:schemaRef ds:uri="http://schemas.microsoft.com/office/infopath/2007/PartnerControls"/>
+    <ds:schemaRef ds:uri="http://purl.org/dc/elements/1.1/"/>
+    <ds:schemaRef ds:uri="http://schemas.microsoft.com/office/2006/metadata/properties"/>
+    <ds:schemaRef ds:uri="3dd97c74-5ef0-47a1-a0c0-112a138906c0"/>
+    <ds:schemaRef ds:uri="bb5988d6-8fef-43bf-8684-73b55c79ce34"/>
+    <ds:schemaRef ds:uri="http://www.w3.org/XML/1998/namespace"/>
+  </ds:schemaRefs>
+</ds:datastoreItem>
+</file>
+
+<file path=customXml/itemProps3.xml><?xml version="1.0" encoding="utf-8"?>
 <ds:datastoreItem xmlns:ds="http://schemas.openxmlformats.org/officeDocument/2006/customXml" ds:itemID="{A5F648EE-0161-49A9-87EA-764B42B4698E}">
   <ds:schemaRefs>
     <ds:schemaRef ds:uri="http://schemas.microsoft.com/office/2006/metadata/contentType"/>
@@ -9279,21 +9161,4 @@
     <ds:schemaRef ds:uri="http://schemas.microsoft.com/internal/obd"/>
   </ds:schemaRefs>
 </ds:datastoreItem>
-</file>
-
-<file path=customXml/itemProps3.xml><?xml version="1.0" encoding="utf-8"?>
-<ds:datastoreItem xmlns:ds="http://schemas.openxmlformats.org/officeDocument/2006/customXml" ds:itemID="{F990F116-B58F-4255-B05B-DA3808E0E5C6}">
-  <ds:schemaRefs>
-    <ds:schemaRef ds:uri="http://schemas.microsoft.com/office/2006/documentManagement/types"/>
-    <ds:schemaRef ds:uri="http://purl.org/dc/terms/"/>
-    <ds:schemaRef ds:uri="http://schemas.openxmlformats.org/package/2006/metadata/core-properties"/>
-    <ds:schemaRef ds:uri="http://purl.org/dc/dcmitype/"/>
-    <ds:schemaRef ds:uri="http://schemas.microsoft.com/office/infopath/2007/PartnerControls"/>
-    <ds:schemaRef ds:uri="http://purl.org/dc/elements/1.1/"/>
-    <ds:schemaRef ds:uri="http://schemas.microsoft.com/office/2006/metadata/properties"/>
-    <ds:schemaRef ds:uri="3dd97c74-5ef0-47a1-a0c0-112a138906c0"/>
-    <ds:schemaRef ds:uri="bb5988d6-8fef-43bf-8684-73b55c79ce34"/>
-    <ds:schemaRef ds:uri="http://www.w3.org/XML/1998/namespace"/>
-  </ds:schemaRefs>
-</ds:datastoreItem>
 </file>
</xml_diff>